<commit_message>
modify PacBio Exp Design
</commit_message>
<xml_diff>
--- a/PacBio-Experimental-Design/PacBio_Experimental_Design.pptx
+++ b/PacBio-Experimental-Design/PacBio_Experimental_Design.pptx
@@ -2,18 +2,19 @@
 <file path=ppt/presentation.xml><?xml version="1.0" encoding="utf-8"?>
 <p:presentation xmlns:a="http://schemas.openxmlformats.org/drawingml/2006/main" xmlns:r="http://schemas.openxmlformats.org/officeDocument/2006/relationships" xmlns:p="http://schemas.openxmlformats.org/presentationml/2006/main" saveSubsetFonts="1" autoCompressPictures="0">
   <p:sldMasterIdLst>
-    <p:sldMasterId id="2147483700" r:id="rId1"/>
+    <p:sldMasterId id="2147483712" r:id="rId1"/>
   </p:sldMasterIdLst>
   <p:notesMasterIdLst>
-    <p:notesMasterId r:id="rId8"/>
+    <p:notesMasterId r:id="rId9"/>
   </p:notesMasterIdLst>
   <p:sldIdLst>
     <p:sldId id="256" r:id="rId2"/>
     <p:sldId id="259" r:id="rId3"/>
     <p:sldId id="260" r:id="rId4"/>
-    <p:sldId id="257" r:id="rId5"/>
-    <p:sldId id="258" r:id="rId6"/>
-    <p:sldId id="261" r:id="rId7"/>
+    <p:sldId id="262" r:id="rId5"/>
+    <p:sldId id="257" r:id="rId6"/>
+    <p:sldId id="258" r:id="rId7"/>
+    <p:sldId id="263" r:id="rId8"/>
   </p:sldIdLst>
   <p:sldSz cx="12192000" cy="6858000"/>
   <p:notesSz cx="6858000" cy="9144000"/>
@@ -535,7 +536,7 @@
           <a:p>
             <a:fld id="{76E26928-AF02-014C-A64D-747878E94874}" type="slidenum">
               <a:rPr lang="en-US" smtClean="0"/>
-              <a:t>4</a:t>
+              <a:t>5</a:t>
             </a:fld>
             <a:endParaRPr lang="en-US"/>
           </a:p>
@@ -734,11 +735,7 @@
         </p:txBody>
       </p:sp>
     </p:spTree>
-    <p:extLst>
-      <p:ext uri="{BB962C8B-B14F-4D97-AF65-F5344CB8AC3E}">
-        <p14:creationId xmlns:p14="http://schemas.microsoft.com/office/powerpoint/2010/main" val="1287118981"/>
-      </p:ext>
-    </p:extLst>
+    <p:extLst/>
   </p:cSld>
   <p:clrMapOvr>
     <a:masterClrMapping/>
@@ -904,11 +901,7 @@
         </p:txBody>
       </p:sp>
     </p:spTree>
-    <p:extLst>
-      <p:ext uri="{BB962C8B-B14F-4D97-AF65-F5344CB8AC3E}">
-        <p14:creationId xmlns:p14="http://schemas.microsoft.com/office/powerpoint/2010/main" val="1454668304"/>
-      </p:ext>
-    </p:extLst>
+    <p:extLst/>
   </p:cSld>
   <p:clrMapOvr>
     <a:masterClrMapping/>
@@ -1084,11 +1077,7 @@
         </p:txBody>
       </p:sp>
     </p:spTree>
-    <p:extLst>
-      <p:ext uri="{BB962C8B-B14F-4D97-AF65-F5344CB8AC3E}">
-        <p14:creationId xmlns:p14="http://schemas.microsoft.com/office/powerpoint/2010/main" val="1656347880"/>
-      </p:ext>
-    </p:extLst>
+    <p:extLst/>
   </p:cSld>
   <p:clrMapOvr>
     <a:masterClrMapping/>
@@ -1254,11 +1243,7 @@
         </p:txBody>
       </p:sp>
     </p:spTree>
-    <p:extLst>
-      <p:ext uri="{BB962C8B-B14F-4D97-AF65-F5344CB8AC3E}">
-        <p14:creationId xmlns:p14="http://schemas.microsoft.com/office/powerpoint/2010/main" val="1005937436"/>
-      </p:ext>
-    </p:extLst>
+    <p:extLst/>
   </p:cSld>
   <p:clrMapOvr>
     <a:masterClrMapping/>
@@ -1500,11 +1485,7 @@
         </p:txBody>
       </p:sp>
     </p:spTree>
-    <p:extLst>
-      <p:ext uri="{BB962C8B-B14F-4D97-AF65-F5344CB8AC3E}">
-        <p14:creationId xmlns:p14="http://schemas.microsoft.com/office/powerpoint/2010/main" val="1799217668"/>
-      </p:ext>
-    </p:extLst>
+    <p:extLst/>
   </p:cSld>
   <p:clrMapOvr>
     <a:masterClrMapping/>
@@ -1732,11 +1713,7 @@
         </p:txBody>
       </p:sp>
     </p:spTree>
-    <p:extLst>
-      <p:ext uri="{BB962C8B-B14F-4D97-AF65-F5344CB8AC3E}">
-        <p14:creationId xmlns:p14="http://schemas.microsoft.com/office/powerpoint/2010/main" val="734112669"/>
-      </p:ext>
-    </p:extLst>
+    <p:extLst/>
   </p:cSld>
   <p:clrMapOvr>
     <a:masterClrMapping/>
@@ -2099,11 +2076,7 @@
         </p:txBody>
       </p:sp>
     </p:spTree>
-    <p:extLst>
-      <p:ext uri="{BB962C8B-B14F-4D97-AF65-F5344CB8AC3E}">
-        <p14:creationId xmlns:p14="http://schemas.microsoft.com/office/powerpoint/2010/main" val="938075868"/>
-      </p:ext>
-    </p:extLst>
+    <p:extLst/>
   </p:cSld>
   <p:clrMapOvr>
     <a:masterClrMapping/>
@@ -2217,11 +2190,7 @@
         </p:txBody>
       </p:sp>
     </p:spTree>
-    <p:extLst>
-      <p:ext uri="{BB962C8B-B14F-4D97-AF65-F5344CB8AC3E}">
-        <p14:creationId xmlns:p14="http://schemas.microsoft.com/office/powerpoint/2010/main" val="1563660849"/>
-      </p:ext>
-    </p:extLst>
+    <p:extLst/>
   </p:cSld>
   <p:clrMapOvr>
     <a:masterClrMapping/>
@@ -2312,11 +2281,7 @@
         </p:txBody>
       </p:sp>
     </p:spTree>
-    <p:extLst>
-      <p:ext uri="{BB962C8B-B14F-4D97-AF65-F5344CB8AC3E}">
-        <p14:creationId xmlns:p14="http://schemas.microsoft.com/office/powerpoint/2010/main" val="1690500804"/>
-      </p:ext>
-    </p:extLst>
+    <p:extLst/>
   </p:cSld>
   <p:clrMapOvr>
     <a:masterClrMapping/>
@@ -2589,11 +2554,7 @@
         </p:txBody>
       </p:sp>
     </p:spTree>
-    <p:extLst>
-      <p:ext uri="{BB962C8B-B14F-4D97-AF65-F5344CB8AC3E}">
-        <p14:creationId xmlns:p14="http://schemas.microsoft.com/office/powerpoint/2010/main" val="1038363018"/>
-      </p:ext>
-    </p:extLst>
+    <p:extLst/>
   </p:cSld>
   <p:clrMapOvr>
     <a:masterClrMapping/>
@@ -2846,11 +2807,7 @@
         </p:txBody>
       </p:sp>
     </p:spTree>
-    <p:extLst>
-      <p:ext uri="{BB962C8B-B14F-4D97-AF65-F5344CB8AC3E}">
-        <p14:creationId xmlns:p14="http://schemas.microsoft.com/office/powerpoint/2010/main" val="1315128004"/>
-      </p:ext>
-    </p:extLst>
+    <p:extLst/>
   </p:cSld>
   <p:clrMapOvr>
     <a:masterClrMapping/>
@@ -3245,23 +3202,23 @@
     </p:spTree>
     <p:extLst>
       <p:ext uri="{BB962C8B-B14F-4D97-AF65-F5344CB8AC3E}">
-        <p14:creationId xmlns:p14="http://schemas.microsoft.com/office/powerpoint/2010/main" val="1593791316"/>
+        <p14:creationId xmlns:p14="http://schemas.microsoft.com/office/powerpoint/2010/main" val="1070503036"/>
       </p:ext>
     </p:extLst>
   </p:cSld>
   <p:clrMap bg1="lt1" tx1="dk1" bg2="lt2" tx2="dk2" accent1="accent1" accent2="accent2" accent3="accent3" accent4="accent4" accent5="accent5" accent6="accent6" hlink="hlink" folHlink="folHlink"/>
   <p:sldLayoutIdLst>
-    <p:sldLayoutId id="2147483701" r:id="rId1"/>
-    <p:sldLayoutId id="2147483702" r:id="rId2"/>
-    <p:sldLayoutId id="2147483703" r:id="rId3"/>
-    <p:sldLayoutId id="2147483704" r:id="rId4"/>
-    <p:sldLayoutId id="2147483705" r:id="rId5"/>
-    <p:sldLayoutId id="2147483706" r:id="rId6"/>
-    <p:sldLayoutId id="2147483707" r:id="rId7"/>
-    <p:sldLayoutId id="2147483708" r:id="rId8"/>
-    <p:sldLayoutId id="2147483709" r:id="rId9"/>
-    <p:sldLayoutId id="2147483710" r:id="rId10"/>
-    <p:sldLayoutId id="2147483711" r:id="rId11"/>
+    <p:sldLayoutId id="2147483713" r:id="rId1"/>
+    <p:sldLayoutId id="2147483714" r:id="rId2"/>
+    <p:sldLayoutId id="2147483715" r:id="rId3"/>
+    <p:sldLayoutId id="2147483716" r:id="rId4"/>
+    <p:sldLayoutId id="2147483717" r:id="rId5"/>
+    <p:sldLayoutId id="2147483718" r:id="rId6"/>
+    <p:sldLayoutId id="2147483719" r:id="rId7"/>
+    <p:sldLayoutId id="2147483720" r:id="rId8"/>
+    <p:sldLayoutId id="2147483721" r:id="rId9"/>
+    <p:sldLayoutId id="2147483722" r:id="rId10"/>
+    <p:sldLayoutId id="2147483723" r:id="rId11"/>
   </p:sldLayoutIdLst>
   <p:txStyles>
     <p:titleStyle>
@@ -3624,7 +3581,6 @@
               <a:rPr lang="en-US" dirty="0" smtClean="0"/>
               <a:t>Cost Estimation</a:t>
             </a:r>
-            <a:endParaRPr lang="en-US" dirty="0" smtClean="0"/>
           </a:p>
         </p:txBody>
       </p:sp>
@@ -3843,6 +3799,13 @@
   <p:clrMapOvr>
     <a:masterClrMapping/>
   </p:clrMapOvr>
+  <p:timing>
+    <p:tnLst>
+      <p:par>
+        <p:cTn id="1" dur="indefinite" restart="never" nodeType="tmRoot"/>
+      </p:par>
+    </p:tnLst>
+  </p:timing>
 </p:sld>
 </file>
 
@@ -4004,6 +3967,13 @@
   <p:clrMapOvr>
     <a:masterClrMapping/>
   </p:clrMapOvr>
+  <p:timing>
+    <p:tnLst>
+      <p:par>
+        <p:cTn id="1" dur="indefinite" restart="never" nodeType="tmRoot"/>
+      </p:par>
+    </p:tnLst>
+  </p:timing>
 </p:sld>
 </file>
 
@@ -4026,7 +3996,7 @@
       </p:grpSpPr>
       <p:sp>
         <p:nvSpPr>
-          <p:cNvPr id="2" name="Title 1"/>
+          <p:cNvPr id="5" name="Title 4"/>
           <p:cNvSpPr>
             <a:spLocks noGrp="1"/>
           </p:cNvSpPr>
@@ -4041,109 +4011,160 @@
           <a:p>
             <a:r>
               <a:rPr lang="en-US" dirty="0" smtClean="0"/>
-              <a:t>Estimating Costs (UC Pricing)</a:t>
+              <a:t>Pacific Biosciences Libraries</a:t>
             </a:r>
             <a:endParaRPr lang="en-US" dirty="0"/>
           </a:p>
         </p:txBody>
       </p:sp>
-      <p:sp>
-        <p:nvSpPr>
-          <p:cNvPr id="3" name="Content Placeholder 2"/>
-          <p:cNvSpPr>
-            <a:spLocks noGrp="1"/>
-          </p:cNvSpPr>
+      <p:pic>
+        <p:nvPicPr>
+          <p:cNvPr id="7" name="Content Placeholder 6"/>
+          <p:cNvPicPr>
+            <a:picLocks noGrp="1" noChangeAspect="1"/>
+          </p:cNvPicPr>
           <p:nvPr>
             <p:ph idx="1"/>
           </p:nvPr>
-        </p:nvSpPr>
-        <p:spPr/>
-        <p:txBody>
-          <a:bodyPr>
-            <a:normAutofit fontScale="92500" lnSpcReduction="10000"/>
+        </p:nvPicPr>
+        <p:blipFill>
+          <a:blip r:embed="rId2">
+            <a:extLst>
+              <a:ext uri="{28A0092B-C50C-407E-A947-70E740481C1C}">
+                <a14:useLocalDpi xmlns:a14="http://schemas.microsoft.com/office/drawing/2010/main" val="0"/>
+              </a:ext>
+            </a:extLst>
+          </a:blip>
+          <a:stretch>
+            <a:fillRect/>
+          </a:stretch>
+        </p:blipFill>
+        <p:spPr>
+          <a:xfrm>
+            <a:off x="3143472" y="4338085"/>
+            <a:ext cx="8374246" cy="1740103"/>
+          </a:xfrm>
+        </p:spPr>
+      </p:pic>
+      <p:sp>
+        <p:nvSpPr>
+          <p:cNvPr id="8" name="TextBox 7"/>
+          <p:cNvSpPr txBox="1"/>
+          <p:nvPr/>
+        </p:nvSpPr>
+        <p:spPr>
+          <a:xfrm>
+            <a:off x="1041991" y="1690688"/>
+            <a:ext cx="10887739" cy="2554545"/>
+          </a:xfrm>
+          <a:prstGeom prst="rect">
+            <a:avLst/>
+          </a:prstGeom>
+          <a:noFill/>
+        </p:spPr>
+        <p:txBody>
+          <a:bodyPr wrap="square" rtlCol="0">
+            <a:spAutoFit/>
           </a:bodyPr>
           <a:lstStyle/>
           <a:p>
-            <a:r>
-              <a:rPr lang="en-US" dirty="0" smtClean="0"/>
-              <a:t>Cost of extracting high-molecular weight DNA</a:t>
-            </a:r>
-          </a:p>
-          <a:p>
-            <a:pPr lvl="1"/>
-            <a:r>
-              <a:rPr lang="en-US" dirty="0" smtClean="0"/>
-              <a:t>Performed within the lab, or by a third-party vendor such as Amplicon Express</a:t>
-            </a:r>
-          </a:p>
-          <a:p>
-            <a:r>
-              <a:rPr lang="en-US" dirty="0"/>
-              <a:t>Library </a:t>
-            </a:r>
-            <a:r>
-              <a:rPr lang="en-US" dirty="0" smtClean="0"/>
-              <a:t>Preparation [ @ $470/library]</a:t>
-            </a:r>
-            <a:endParaRPr lang="en-US" dirty="0"/>
-          </a:p>
-          <a:p>
-            <a:r>
-              <a:rPr lang="en-US" dirty="0" smtClean="0"/>
-              <a:t>Blue Pippen size selection [ @ $</a:t>
-            </a:r>
-            <a:r>
-              <a:rPr lang="is-IS" dirty="0" smtClean="0"/>
-              <a:t>142/2-libraries ]</a:t>
-            </a:r>
-            <a:endParaRPr lang="en-US" dirty="0" smtClean="0"/>
-          </a:p>
-          <a:p>
-            <a:r>
-              <a:rPr lang="en-US" dirty="0" smtClean="0"/>
-              <a:t>First SMRT cell (calibrate loading) [ @ $429 ]</a:t>
-            </a:r>
-          </a:p>
-          <a:p>
-            <a:r>
-              <a:rPr lang="en-US" dirty="0" smtClean="0"/>
-              <a:t>Remaining SMRT cells [ @ $383/SMRT, 10 SMRT cells per library ]</a:t>
-            </a:r>
-          </a:p>
-          <a:p>
-            <a:r>
-              <a:rPr lang="en-US" dirty="0" smtClean="0"/>
-              <a:t>Bioinformatic Assembly [ 40 hours @ $97/hour ]</a:t>
-            </a:r>
-          </a:p>
-          <a:p>
-            <a:endParaRPr lang="en-US" dirty="0"/>
-          </a:p>
-          <a:p>
-            <a:pPr marL="0" indent="0">
-              <a:buNone/>
+            <a:pPr marL="285750" indent="-285750">
+              <a:buFont typeface="Arial" charset="0"/>
+              <a:buChar char="•"/>
             </a:pPr>
             <a:r>
-              <a:rPr lang="en-US" sz="3000" b="1" dirty="0" smtClean="0">
-                <a:solidFill>
-                  <a:schemeClr val="tx2"/>
-                </a:solidFill>
-              </a:rPr>
-              <a:t>Use an estimate of 1Gb/SMRT cell and target &gt; 65x coverage for a goal of &gt; 30x coverage of &gt; 10Kb reads.</a:t>
-            </a:r>
+              <a:rPr lang="en-US" sz="3200" dirty="0" smtClean="0"/>
+              <a:t>Structurally linear</a:t>
+            </a:r>
+          </a:p>
+          <a:p>
+            <a:pPr marL="285750" indent="-285750">
+              <a:buFont typeface="Arial" charset="0"/>
+              <a:buChar char="•"/>
+            </a:pPr>
+            <a:r>
+              <a:rPr lang="en-US" sz="3200" dirty="0" smtClean="0"/>
+              <a:t>Topologically </a:t>
+            </a:r>
+            <a:r>
+              <a:rPr lang="en-US" sz="3200" dirty="0"/>
+              <a:t>c</a:t>
+            </a:r>
+            <a:r>
+              <a:rPr lang="en-US" sz="3200" dirty="0" smtClean="0"/>
+              <a:t>ircular</a:t>
+            </a:r>
+          </a:p>
+          <a:p>
+            <a:pPr marL="285750" indent="-285750">
+              <a:buFont typeface="Arial" charset="0"/>
+              <a:buChar char="•"/>
+            </a:pPr>
+            <a:r>
+              <a:rPr lang="en-US" sz="3200" dirty="0" smtClean="0"/>
+              <a:t>Structural homogeneity of templates</a:t>
+            </a:r>
+          </a:p>
+          <a:p>
+            <a:pPr marL="285750" indent="-285750">
+              <a:buFont typeface="Arial" charset="0"/>
+              <a:buChar char="•"/>
+            </a:pPr>
+            <a:r>
+              <a:rPr lang="en-US" sz="3200" dirty="0" smtClean="0"/>
+              <a:t>Provides sequences of both forward and reverse strands in the same trace.</a:t>
+            </a:r>
+            <a:endParaRPr lang="en-US" sz="3200" dirty="0"/>
+          </a:p>
+        </p:txBody>
+      </p:sp>
+      <p:sp>
+        <p:nvSpPr>
+          <p:cNvPr id="9" name="TextBox 8"/>
+          <p:cNvSpPr txBox="1"/>
+          <p:nvPr/>
+        </p:nvSpPr>
+        <p:spPr>
+          <a:xfrm>
+            <a:off x="1041991" y="6339813"/>
+            <a:ext cx="5635256" cy="461665"/>
+          </a:xfrm>
+          <a:prstGeom prst="rect">
+            <a:avLst/>
+          </a:prstGeom>
+          <a:noFill/>
+        </p:spPr>
+        <p:txBody>
+          <a:bodyPr wrap="square" rtlCol="0">
+            <a:spAutoFit/>
+          </a:bodyPr>
+          <a:lstStyle/>
+          <a:p>
+            <a:r>
+              <a:rPr lang="en-US" sz="2400" dirty="0" smtClean="0"/>
+              <a:t>Input recommends 15ug of DNA per library</a:t>
+            </a:r>
+            <a:endParaRPr lang="en-US" sz="2400" dirty="0"/>
           </a:p>
         </p:txBody>
       </p:sp>
     </p:spTree>
     <p:extLst>
       <p:ext uri="{BB962C8B-B14F-4D97-AF65-F5344CB8AC3E}">
-        <p14:creationId xmlns:p14="http://schemas.microsoft.com/office/powerpoint/2010/main" val="117368526"/>
+        <p14:creationId xmlns:p14="http://schemas.microsoft.com/office/powerpoint/2010/main" val="1240485616"/>
       </p:ext>
     </p:extLst>
   </p:cSld>
   <p:clrMapOvr>
     <a:masterClrMapping/>
   </p:clrMapOvr>
+  <p:timing>
+    <p:tnLst>
+      <p:par>
+        <p:cTn id="1" dur="indefinite" restart="never" nodeType="tmRoot"/>
+      </p:par>
+    </p:tnLst>
+  </p:timing>
 </p:sld>
 </file>
 
@@ -4181,7 +4202,7 @@
           <a:p>
             <a:r>
               <a:rPr lang="en-US" dirty="0" smtClean="0"/>
-              <a:t>Cost estimation exercises</a:t>
+              <a:t>Estimating Costs (UC Pricing)</a:t>
             </a:r>
             <a:endParaRPr lang="en-US" dirty="0"/>
           </a:p>
@@ -4199,54 +4220,134 @@
         </p:nvSpPr>
         <p:spPr/>
         <p:txBody>
-          <a:bodyPr/>
+          <a:bodyPr>
+            <a:normAutofit fontScale="92500" lnSpcReduction="10000"/>
+          </a:bodyPr>
           <a:lstStyle/>
           <a:p>
             <a:r>
               <a:rPr lang="en-US" dirty="0" smtClean="0"/>
-              <a:t>Cost of a 200Mb Genome?</a:t>
-            </a:r>
-          </a:p>
-          <a:p>
+              <a:t>Cost of extracting high-molecular weight DNA</a:t>
+            </a:r>
+          </a:p>
+          <a:p>
+            <a:pPr lvl="1"/>
+            <a:r>
+              <a:rPr lang="en-US" dirty="0" smtClean="0"/>
+              <a:t>Performed within the lab, or by a third-party vendor such as Amplicon Express</a:t>
+            </a:r>
+          </a:p>
+          <a:p>
+            <a:r>
+              <a:rPr lang="en-US" dirty="0"/>
+              <a:t>Library </a:t>
+            </a:r>
+            <a:r>
+              <a:rPr lang="en-US" dirty="0" smtClean="0"/>
+              <a:t>Preparation [ @ $470/library]</a:t>
+            </a:r>
             <a:endParaRPr lang="en-US" dirty="0"/>
           </a:p>
           <a:p>
             <a:r>
               <a:rPr lang="en-US" dirty="0" smtClean="0"/>
-              <a:t>Cost of a 1Gb Genome?</a:t>
-            </a:r>
-          </a:p>
-          <a:p>
+              <a:t>Blue Pippen size selection [ @ $</a:t>
+            </a:r>
+            <a:r>
+              <a:rPr lang="is-IS" dirty="0" smtClean="0"/>
+              <a:t>142/2-libraries ]</a:t>
+            </a:r>
             <a:endParaRPr lang="en-US" dirty="0" smtClean="0"/>
           </a:p>
           <a:p>
             <a:r>
               <a:rPr lang="en-US" dirty="0" smtClean="0"/>
-              <a:t>Cost of human sized 3Gb Genome?</a:t>
+              <a:t>First SMRT cell (calibrate loading) [ @ $429 ]</a:t>
+            </a:r>
+          </a:p>
+          <a:p>
+            <a:r>
+              <a:rPr lang="en-US" dirty="0" smtClean="0"/>
+              <a:t>Remaining SMRT cells [ @ $383/SMRT, 10 SMRT cells per library ]</a:t>
+            </a:r>
+          </a:p>
+          <a:p>
+            <a:r>
+              <a:rPr lang="en-US" dirty="0" smtClean="0"/>
+              <a:t>Bioinformatic Assembly [ 40 hours @ $97/hour ]</a:t>
             </a:r>
           </a:p>
           <a:p>
             <a:endParaRPr lang="en-US" dirty="0"/>
           </a:p>
           <a:p>
-            <a:r>
-              <a:rPr lang="en-US" dirty="0" smtClean="0"/>
-              <a:t>Cost of crazy salamander 15Gb genome?</a:t>
-            </a:r>
-            <a:endParaRPr lang="en-US" dirty="0"/>
+            <a:pPr marL="0" indent="0">
+              <a:buNone/>
+            </a:pPr>
+            <a:r>
+              <a:rPr lang="en-US" sz="3000" b="1" dirty="0" smtClean="0">
+                <a:solidFill>
+                  <a:schemeClr val="tx2"/>
+                </a:solidFill>
+              </a:rPr>
+              <a:t>Use an estimate of 1Gb/SMRT cell and target &gt; 65x coverage for a goal of &gt; 30x coverage of &gt; 10Kb reads.</a:t>
+            </a:r>
+          </a:p>
+        </p:txBody>
+      </p:sp>
+      <p:sp>
+        <p:nvSpPr>
+          <p:cNvPr id="4" name="Rectangle 3"/>
+          <p:cNvSpPr/>
+          <p:nvPr/>
+        </p:nvSpPr>
+        <p:spPr>
+          <a:xfrm>
+            <a:off x="5742093" y="6215654"/>
+            <a:ext cx="6449907" cy="461665"/>
+          </a:xfrm>
+          <a:prstGeom prst="rect">
+            <a:avLst/>
+          </a:prstGeom>
+        </p:spPr>
+        <p:txBody>
+          <a:bodyPr wrap="none">
+            <a:spAutoFit/>
+          </a:bodyPr>
+          <a:lstStyle/>
+          <a:p>
+            <a:r>
+              <a:rPr lang="en-US" sz="2400" dirty="0"/>
+              <a:t>http://</a:t>
+            </a:r>
+            <a:r>
+              <a:rPr lang="en-US" sz="2400" dirty="0" err="1"/>
+              <a:t>dnatech.genomecenter.ucdavis.edu</a:t>
+            </a:r>
+            <a:r>
+              <a:rPr lang="en-US" sz="2400" dirty="0"/>
+              <a:t>/prices/</a:t>
+            </a:r>
           </a:p>
         </p:txBody>
       </p:sp>
     </p:spTree>
     <p:extLst>
       <p:ext uri="{BB962C8B-B14F-4D97-AF65-F5344CB8AC3E}">
-        <p14:creationId xmlns:p14="http://schemas.microsoft.com/office/powerpoint/2010/main" val="1953744475"/>
+        <p14:creationId xmlns:p14="http://schemas.microsoft.com/office/powerpoint/2010/main" val="117368526"/>
       </p:ext>
     </p:extLst>
   </p:cSld>
   <p:clrMapOvr>
     <a:masterClrMapping/>
   </p:clrMapOvr>
+  <p:timing>
+    <p:tnLst>
+      <p:par>
+        <p:cTn id="1" dur="indefinite" restart="never" nodeType="tmRoot"/>
+      </p:par>
+    </p:tnLst>
+  </p:timing>
 </p:sld>
 </file>
 
@@ -4284,7 +4385,7 @@
           <a:p>
             <a:r>
               <a:rPr lang="en-US" dirty="0" smtClean="0"/>
-              <a:t>Evaluating SMRT Cells</a:t>
+              <a:t>Cost estimation exercises</a:t>
             </a:r>
             <a:endParaRPr lang="en-US" dirty="0"/>
           </a:p>
@@ -4307,15 +4408,34 @@
           <a:p>
             <a:r>
               <a:rPr lang="en-US" dirty="0" smtClean="0"/>
-              <a:t>Result of RSII are </a:t>
-            </a:r>
-            <a:r>
-              <a:rPr lang="en-US" dirty="0" err="1" smtClean="0"/>
-              <a:t>fasta</a:t>
-            </a:r>
+              <a:t>Cost of a 200Mb Genome?</a:t>
+            </a:r>
+          </a:p>
+          <a:p>
+            <a:endParaRPr lang="en-US" dirty="0"/>
+          </a:p>
+          <a:p>
             <a:r>
               <a:rPr lang="en-US" dirty="0" smtClean="0"/>
-              <a:t> files</a:t>
+              <a:t>Cost of a 1Gb Genome?</a:t>
+            </a:r>
+          </a:p>
+          <a:p>
+            <a:endParaRPr lang="en-US" dirty="0" smtClean="0"/>
+          </a:p>
+          <a:p>
+            <a:r>
+              <a:rPr lang="en-US" dirty="0" smtClean="0"/>
+              <a:t>Cost of human sized 3Gb Genome?</a:t>
+            </a:r>
+          </a:p>
+          <a:p>
+            <a:endParaRPr lang="en-US" dirty="0"/>
+          </a:p>
+          <a:p>
+            <a:r>
+              <a:rPr lang="en-US" dirty="0" smtClean="0"/>
+              <a:t>Cost of crazy salamander 15Gb genome?</a:t>
             </a:r>
             <a:endParaRPr lang="en-US" dirty="0"/>
           </a:p>
@@ -4324,7 +4444,203 @@
     </p:spTree>
     <p:extLst>
       <p:ext uri="{BB962C8B-B14F-4D97-AF65-F5344CB8AC3E}">
-        <p14:creationId xmlns:p14="http://schemas.microsoft.com/office/powerpoint/2010/main" val="2012664319"/>
+        <p14:creationId xmlns:p14="http://schemas.microsoft.com/office/powerpoint/2010/main" val="1953744475"/>
+      </p:ext>
+    </p:extLst>
+  </p:cSld>
+  <p:clrMapOvr>
+    <a:masterClrMapping/>
+  </p:clrMapOvr>
+  <p:timing>
+    <p:tnLst>
+      <p:par>
+        <p:cTn id="1" dur="indefinite" restart="never" nodeType="tmRoot"/>
+      </p:par>
+    </p:tnLst>
+  </p:timing>
+</p:sld>
+</file>
+
+<file path=ppt/slides/slide7.xml><?xml version="1.0" encoding="utf-8"?>
+<p:sld xmlns:a="http://schemas.openxmlformats.org/drawingml/2006/main" xmlns:r="http://schemas.openxmlformats.org/officeDocument/2006/relationships" xmlns:p="http://schemas.openxmlformats.org/presentationml/2006/main">
+  <p:cSld>
+    <p:spTree>
+      <p:nvGrpSpPr>
+        <p:cNvPr id="1" name=""/>
+        <p:cNvGrpSpPr/>
+        <p:nvPr/>
+      </p:nvGrpSpPr>
+      <p:grpSpPr>
+        <a:xfrm>
+          <a:off x="0" y="0"/>
+          <a:ext cx="0" cy="0"/>
+          <a:chOff x="0" y="0"/>
+          <a:chExt cx="0" cy="0"/>
+        </a:xfrm>
+      </p:grpSpPr>
+      <p:sp>
+        <p:nvSpPr>
+          <p:cNvPr id="3" name="Content Placeholder 2"/>
+          <p:cNvSpPr>
+            <a:spLocks noGrp="1"/>
+          </p:cNvSpPr>
+          <p:nvPr>
+            <p:ph idx="1"/>
+          </p:nvPr>
+        </p:nvSpPr>
+        <p:spPr>
+          <a:xfrm>
+            <a:off x="838200" y="659219"/>
+            <a:ext cx="10515600" cy="5517744"/>
+          </a:xfrm>
+        </p:spPr>
+        <p:txBody>
+          <a:bodyPr/>
+          <a:lstStyle/>
+          <a:p>
+            <a:r>
+              <a:rPr lang="en-US" dirty="0"/>
+              <a:t>Cost of a 200Mb Genome?</a:t>
+            </a:r>
+          </a:p>
+          <a:p>
+            <a:pPr lvl="1"/>
+            <a:r>
+              <a:rPr lang="en-US" dirty="0" smtClean="0"/>
+              <a:t>200Mb * 65x = 13Gb = 13 SMRT Cells, Means 2 Libraries, 1 Pippen</a:t>
+            </a:r>
+          </a:p>
+          <a:p>
+            <a:pPr lvl="1"/>
+            <a:r>
+              <a:rPr lang="en-US" dirty="0" smtClean="0"/>
+              <a:t>383*12+429*1+142*1+470*1+40*97 = $9,517</a:t>
+            </a:r>
+            <a:endParaRPr lang="en-US" dirty="0"/>
+          </a:p>
+          <a:p>
+            <a:r>
+              <a:rPr lang="en-US" dirty="0"/>
+              <a:t>Cost of a 1Gb Genome?</a:t>
+            </a:r>
+          </a:p>
+          <a:p>
+            <a:pPr lvl="1"/>
+            <a:r>
+              <a:rPr lang="en-US" dirty="0" smtClean="0"/>
+              <a:t>1Gb * 65x = 65Gb = 65 SMRT Cells, Means  7 Libraries, 4 Pippen</a:t>
+            </a:r>
+          </a:p>
+          <a:p>
+            <a:pPr lvl="1"/>
+            <a:r>
+              <a:rPr lang="en-US" dirty="0" smtClean="0"/>
+              <a:t>383*65+429*1+142*4+470*7+40*97 = $33,062</a:t>
+            </a:r>
+            <a:endParaRPr lang="en-US" dirty="0"/>
+          </a:p>
+          <a:p>
+            <a:r>
+              <a:rPr lang="en-US" dirty="0"/>
+              <a:t>Cost of human sized 3Gb Genome?</a:t>
+            </a:r>
+          </a:p>
+          <a:p>
+            <a:pPr lvl="1"/>
+            <a:r>
+              <a:rPr lang="en-US" dirty="0" smtClean="0"/>
+              <a:t>3GB * 65x = 195Gb = 195 SMRT Cells, Means 20 Libraries, 10 Pippen</a:t>
+            </a:r>
+          </a:p>
+          <a:p>
+            <a:pPr lvl="1"/>
+            <a:r>
+              <a:rPr lang="en-US" dirty="0" smtClean="0"/>
+              <a:t>383*195+429*1+142*10+470*20+40*97 = $89,814</a:t>
+            </a:r>
+            <a:endParaRPr lang="en-US" dirty="0"/>
+          </a:p>
+          <a:p>
+            <a:r>
+              <a:rPr lang="en-US" dirty="0"/>
+              <a:t>Cost of crazy salamander 15Gb genome</a:t>
+            </a:r>
+            <a:r>
+              <a:rPr lang="en-US" dirty="0" smtClean="0"/>
+              <a:t>?</a:t>
+            </a:r>
+          </a:p>
+          <a:p>
+            <a:pPr lvl="1"/>
+            <a:r>
+              <a:rPr lang="en-US" dirty="0" smtClean="0"/>
+              <a:t>15GB </a:t>
+            </a:r>
+            <a:r>
+              <a:rPr lang="en-US" dirty="0"/>
+              <a:t>* 65x = </a:t>
+            </a:r>
+            <a:r>
+              <a:rPr lang="en-US" dirty="0" smtClean="0"/>
+              <a:t>975Gb= 975 </a:t>
+            </a:r>
+            <a:r>
+              <a:rPr lang="en-US" dirty="0"/>
+              <a:t>SMRT Cells, Means </a:t>
+            </a:r>
+            <a:r>
+              <a:rPr lang="en-US" dirty="0" smtClean="0"/>
+              <a:t>98 </a:t>
+            </a:r>
+            <a:r>
+              <a:rPr lang="en-US" dirty="0"/>
+              <a:t>Libraries, </a:t>
+            </a:r>
+            <a:r>
+              <a:rPr lang="en-US" dirty="0" smtClean="0"/>
+              <a:t>44 </a:t>
+            </a:r>
+            <a:r>
+              <a:rPr lang="en-US" dirty="0"/>
+              <a:t>Pippen</a:t>
+            </a:r>
+          </a:p>
+          <a:p>
+            <a:pPr lvl="1"/>
+            <a:r>
+              <a:rPr lang="en-US" dirty="0" smtClean="0"/>
+              <a:t>383*975+429*1+142*98+470*44+40*97 </a:t>
+            </a:r>
+            <a:r>
+              <a:rPr lang="en-US" dirty="0"/>
+              <a:t>= </a:t>
+            </a:r>
+            <a:r>
+              <a:rPr lang="en-US" dirty="0" smtClean="0"/>
+              <a:t>$</a:t>
+            </a:r>
+            <a:r>
+              <a:rPr lang="is-IS" dirty="0"/>
+              <a:t> </a:t>
+            </a:r>
+            <a:r>
+              <a:rPr lang="is-IS" dirty="0" smtClean="0"/>
+              <a:t>412,330</a:t>
+            </a:r>
+            <a:endParaRPr lang="en-US" dirty="0"/>
+          </a:p>
+          <a:p>
+            <a:endParaRPr lang="en-US" dirty="0"/>
+          </a:p>
+          <a:p>
+            <a:endParaRPr lang="en-US" dirty="0"/>
+          </a:p>
+        </p:txBody>
+      </p:sp>
+    </p:spTree>
+    <p:extLst>
+      <p:ext uri="{BB962C8B-B14F-4D97-AF65-F5344CB8AC3E}">
+        <p14:creationId xmlns:p14="http://schemas.microsoft.com/office/powerpoint/2010/main" val="1597171708"/>
       </p:ext>
     </p:extLst>
   </p:cSld>
@@ -4589,7 +4905,7 @@
   <a:extraClrSchemeLst/>
   <a:extLst>
     <a:ext uri="{05A4C25C-085E-4340-85A3-A5531E510DB2}">
-      <thm15:themeFamily xmlns:thm15="http://schemas.microsoft.com/office/thememl/2012/main" name="Presentation6" id="{D3FC44A4-49ED-2F46-A784-F2AFB35CEBAA}" vid="{306A6F1E-9F34-C64F-8D8E-471C431EC3EA}"/>
+      <thm15:themeFamily xmlns:thm15="http://schemas.microsoft.com/office/thememl/2012/main" name="UCDavis-theme" id="{AE972D25-45FB-BE40-B213-B935FB0AD6AD}" vid="{D73787BA-0B09-294F-A9E2-4655B76E42D4}"/>
     </a:ext>
   </a:extLst>
 </a:theme>

</xml_diff>